<commit_message>
refactor and update time-tracking pierre. add animations to abschlussbericht
</commit_message>
<xml_diff>
--- a/abschlussbericht/magic-tiles.pptx
+++ b/abschlussbericht/magic-tiles.pptx
@@ -10908,7 +10908,7 @@
         <p:spPr>
           <a:xfrm>
             <a:off x="0" y="5500080"/>
-            <a:ext cx="12252600" cy="1577520"/>
+            <a:ext cx="12252240" cy="1577160"/>
           </a:xfrm>
           <a:prstGeom prst="rect">
             <a:avLst/>
@@ -10957,7 +10957,7 @@
         <p:spPr>
           <a:xfrm>
             <a:off x="9676800" y="386640"/>
-            <a:ext cx="6482160" cy="5736600"/>
+            <a:ext cx="6481800" cy="5736240"/>
           </a:xfrm>
           <a:prstGeom prst="rect">
             <a:avLst/>
@@ -10996,13 +10996,7 @@
               <a:rPr b="0" lang="de-DE" sz="4400" spc="-1" strike="noStrike">
                 <a:latin typeface="Arial"/>
               </a:rPr>
-              <a:t>Format des Titeltextes </a:t>
-            </a:r>
-            <a:r>
-              <a:rPr b="0" lang="de-DE" sz="4400" spc="-1" strike="noStrike">
-                <a:latin typeface="Arial"/>
-              </a:rPr>
-              <a:t>durch Klicken bearbeiten</a:t>
+              <a:t>Format des Titeltextes durch Klicken bearbeiten</a:t>
             </a:r>
             <a:endParaRPr b="0" lang="de-DE" sz="4400" spc="-1" strike="noStrike">
               <a:latin typeface="Arial"/>
@@ -11762,7 +11756,7 @@
         <p:spPr>
           <a:xfrm>
             <a:off x="8153280" y="360"/>
-            <a:ext cx="4036680" cy="6855840"/>
+            <a:ext cx="4036320" cy="6855480"/>
           </a:xfrm>
           <a:prstGeom prst="rect">
             <a:avLst/>
@@ -12053,7 +12047,7 @@
         <p:spPr>
           <a:xfrm>
             <a:off x="8153280" y="360"/>
-            <a:ext cx="4036680" cy="6855840"/>
+            <a:ext cx="4036320" cy="6855480"/>
           </a:xfrm>
           <a:prstGeom prst="rect">
             <a:avLst/>
@@ -12607,7 +12601,7 @@
         <p:spPr>
           <a:xfrm>
             <a:off x="609480" y="273600"/>
-            <a:ext cx="10972080" cy="1144440"/>
+            <a:ext cx="10972440" cy="1144800"/>
           </a:xfrm>
           <a:prstGeom prst="rect">
             <a:avLst/>
@@ -12618,13 +12612,14 @@
             <a:noAutofit/>
           </a:bodyPr>
           <a:p>
+            <a:pPr algn="ctr"/>
             <a:r>
-              <a:rPr b="0" lang="de-DE" sz="1800" spc="-1" strike="noStrike">
+              <a:rPr b="0" lang="de-DE" sz="4400" spc="-1" strike="noStrike">
                 <a:latin typeface="Arial"/>
               </a:rPr>
               <a:t>Format des Titeltextes durch Klicken bearbeiten</a:t>
             </a:r>
-            <a:endParaRPr b="0" lang="de-DE" sz="1800" spc="-1" strike="noStrike">
+            <a:endParaRPr b="0" lang="de-DE" sz="4400" spc="-1" strike="noStrike">
               <a:latin typeface="Arial"/>
             </a:endParaRPr>
           </a:p>
@@ -12643,7 +12638,7 @@
         <p:spPr>
           <a:xfrm>
             <a:off x="609480" y="1604520"/>
-            <a:ext cx="10972080" cy="3976920"/>
+            <a:ext cx="10972440" cy="3977280"/>
           </a:xfrm>
           <a:prstGeom prst="rect">
             <a:avLst/>
@@ -12666,12 +12661,12 @@
               <a:buChar char=""/>
             </a:pPr>
             <a:r>
-              <a:rPr b="0" lang="de-DE" sz="1800" spc="-1" strike="noStrike">
+              <a:rPr b="0" lang="de-DE" sz="3200" spc="-1" strike="noStrike">
                 <a:latin typeface="Arial"/>
               </a:rPr>
               <a:t>Format des Gliederungstextes durch Klicken bearbeiten</a:t>
             </a:r>
-            <a:endParaRPr b="0" lang="de-DE" sz="1800" spc="-1" strike="noStrike">
+            <a:endParaRPr b="0" lang="de-DE" sz="3200" spc="-1" strike="noStrike">
               <a:latin typeface="Arial"/>
             </a:endParaRPr>
           </a:p>
@@ -12688,12 +12683,12 @@
               <a:buChar char=""/>
             </a:pPr>
             <a:r>
-              <a:rPr b="0" lang="de-DE" sz="1800" spc="-1" strike="noStrike">
+              <a:rPr b="0" lang="de-DE" sz="2800" spc="-1" strike="noStrike">
                 <a:latin typeface="Arial"/>
               </a:rPr>
               <a:t>Zweite Gliederungsebene</a:t>
             </a:r>
-            <a:endParaRPr b="0" lang="de-DE" sz="1800" spc="-1" strike="noStrike">
+            <a:endParaRPr b="0" lang="de-DE" sz="2800" spc="-1" strike="noStrike">
               <a:latin typeface="Arial"/>
             </a:endParaRPr>
           </a:p>
@@ -12710,12 +12705,12 @@
               <a:buChar char=""/>
             </a:pPr>
             <a:r>
-              <a:rPr b="0" lang="de-DE" sz="1800" spc="-1" strike="noStrike">
+              <a:rPr b="0" lang="de-DE" sz="2400" spc="-1" strike="noStrike">
                 <a:latin typeface="Arial"/>
               </a:rPr>
               <a:t>Dritte Gliederungsebene</a:t>
             </a:r>
-            <a:endParaRPr b="0" lang="de-DE" sz="1800" spc="-1" strike="noStrike">
+            <a:endParaRPr b="0" lang="de-DE" sz="2400" spc="-1" strike="noStrike">
               <a:latin typeface="Arial"/>
             </a:endParaRPr>
           </a:p>
@@ -12732,12 +12727,12 @@
               <a:buChar char=""/>
             </a:pPr>
             <a:r>
-              <a:rPr b="0" lang="de-DE" sz="1800" spc="-1" strike="noStrike">
+              <a:rPr b="0" lang="de-DE" sz="2000" spc="-1" strike="noStrike">
                 <a:latin typeface="Arial"/>
               </a:rPr>
               <a:t>Vierte Gliederungsebene</a:t>
             </a:r>
-            <a:endParaRPr b="0" lang="de-DE" sz="1800" spc="-1" strike="noStrike">
+            <a:endParaRPr b="0" lang="de-DE" sz="2000" spc="-1" strike="noStrike">
               <a:latin typeface="Arial"/>
             </a:endParaRPr>
           </a:p>
@@ -12754,12 +12749,12 @@
               <a:buChar char=""/>
             </a:pPr>
             <a:r>
-              <a:rPr b="0" lang="de-DE" sz="1800" spc="-1" strike="noStrike">
+              <a:rPr b="0" lang="de-DE" sz="2000" spc="-1" strike="noStrike">
                 <a:latin typeface="Arial"/>
               </a:rPr>
               <a:t>Fünfte Gliederungsebene</a:t>
             </a:r>
-            <a:endParaRPr b="0" lang="de-DE" sz="1800" spc="-1" strike="noStrike">
+            <a:endParaRPr b="0" lang="de-DE" sz="2000" spc="-1" strike="noStrike">
               <a:latin typeface="Arial"/>
             </a:endParaRPr>
           </a:p>
@@ -12776,12 +12771,12 @@
               <a:buChar char=""/>
             </a:pPr>
             <a:r>
-              <a:rPr b="0" lang="de-DE" sz="1800" spc="-1" strike="noStrike">
+              <a:rPr b="0" lang="de-DE" sz="2000" spc="-1" strike="noStrike">
                 <a:latin typeface="Arial"/>
               </a:rPr>
               <a:t>Sechste Gliederungsebene</a:t>
             </a:r>
-            <a:endParaRPr b="0" lang="de-DE" sz="1800" spc="-1" strike="noStrike">
+            <a:endParaRPr b="0" lang="de-DE" sz="2000" spc="-1" strike="noStrike">
               <a:latin typeface="Arial"/>
             </a:endParaRPr>
           </a:p>
@@ -12798,12 +12793,12 @@
               <a:buChar char=""/>
             </a:pPr>
             <a:r>
-              <a:rPr b="0" lang="de-DE" sz="1800" spc="-1" strike="noStrike">
+              <a:rPr b="0" lang="de-DE" sz="2000" spc="-1" strike="noStrike">
                 <a:latin typeface="Arial"/>
               </a:rPr>
               <a:t>Siebte Gliederungsebene</a:t>
             </a:r>
-            <a:endParaRPr b="0" lang="de-DE" sz="1800" spc="-1" strike="noStrike">
+            <a:endParaRPr b="0" lang="de-DE" sz="2000" spc="-1" strike="noStrike">
               <a:latin typeface="Arial"/>
             </a:endParaRPr>
           </a:p>
@@ -12866,7 +12861,7 @@
         <p:spPr>
           <a:xfrm>
             <a:off x="1136880" y="588960"/>
-            <a:ext cx="3467520" cy="5290560"/>
+            <a:ext cx="3467160" cy="5290200"/>
           </a:xfrm>
           <a:prstGeom prst="rect">
             <a:avLst/>
@@ -12889,7 +12884,7 @@
         <p:spPr>
           <a:xfrm>
             <a:off x="4753800" y="1197000"/>
-            <a:ext cx="7381080" cy="4074480"/>
+            <a:ext cx="7380720" cy="4074120"/>
           </a:xfrm>
           <a:prstGeom prst="rect">
             <a:avLst/>
@@ -13161,7 +13156,7 @@
         <p:spPr>
           <a:xfrm>
             <a:off x="532800" y="1098720"/>
-            <a:ext cx="9142200" cy="2385720"/>
+            <a:ext cx="9141840" cy="2385360"/>
           </a:xfrm>
           <a:prstGeom prst="rect">
             <a:avLst/>
@@ -13212,7 +13207,7 @@
         <p:spPr>
           <a:xfrm>
             <a:off x="532800" y="3717360"/>
-            <a:ext cx="9142200" cy="1653840"/>
+            <a:ext cx="9141840" cy="1653480"/>
           </a:xfrm>
           <a:prstGeom prst="rect">
             <a:avLst/>
@@ -13299,7 +13294,7 @@
         <p:spPr>
           <a:xfrm>
             <a:off x="901800" y="2912760"/>
-            <a:ext cx="2872800" cy="941400"/>
+            <a:ext cx="2872440" cy="941040"/>
           </a:xfrm>
           <a:prstGeom prst="rect">
             <a:avLst/>
@@ -13325,7 +13320,7 @@
         <p:spPr>
           <a:xfrm>
             <a:off x="4658760" y="2907360"/>
-            <a:ext cx="2872800" cy="515520"/>
+            <a:ext cx="2872440" cy="515160"/>
           </a:xfrm>
           <a:prstGeom prst="rect">
             <a:avLst/>
@@ -13351,7 +13346,7 @@
         <p:spPr>
           <a:xfrm>
             <a:off x="8336520" y="2892240"/>
-            <a:ext cx="3129120" cy="1001880"/>
+            <a:ext cx="3128760" cy="1001520"/>
           </a:xfrm>
           <a:prstGeom prst="rect">
             <a:avLst/>
@@ -13377,7 +13372,7 @@
         <p:spPr>
           <a:xfrm>
             <a:off x="2690280" y="925200"/>
-            <a:ext cx="6809760" cy="1308600"/>
+            <a:ext cx="6809400" cy="1308600"/>
           </a:xfrm>
           <a:prstGeom prst="rect">
             <a:avLst/>
@@ -13500,7 +13495,7 @@
         <p:spPr>
           <a:xfrm>
             <a:off x="4773600" y="3723480"/>
-            <a:ext cx="2642760" cy="515160"/>
+            <a:ext cx="2642400" cy="514800"/>
           </a:xfrm>
           <a:prstGeom prst="rect">
             <a:avLst/>
@@ -13526,7 +13521,7 @@
         <p:spPr>
           <a:xfrm>
             <a:off x="1080000" y="2700000"/>
-            <a:ext cx="8998560" cy="856800"/>
+            <a:ext cx="8998200" cy="856440"/>
           </a:xfrm>
           <a:prstGeom prst="rect">
             <a:avLst/>
@@ -13547,7 +13542,7 @@
             <a:noAutofit/>
           </a:bodyPr>
           <a:p>
-            <a:pPr lvl="1" marL="432000" indent="-214920">
+            <a:pPr lvl="1" marL="432000" indent="-214560">
               <a:lnSpc>
                 <a:spcPct val="100000"/>
               </a:lnSpc>
@@ -13576,11 +13571,10 @@
             </a:r>
             <a:endParaRPr b="0" lang="de-DE" sz="1800" spc="-1" strike="noStrike">
               <a:latin typeface="Arial"/>
-              <a:ea typeface="Noto Sans CJK SC"/>
-            </a:endParaRPr>
-          </a:p>
-          <a:p>
-            <a:pPr lvl="1" marL="432000" indent="-214920">
+            </a:endParaRPr>
+          </a:p>
+          <a:p>
+            <a:pPr lvl="1" marL="432000" indent="-214560">
               <a:lnSpc>
                 <a:spcPct val="100000"/>
               </a:lnSpc>
@@ -13609,11 +13603,10 @@
             </a:r>
             <a:endParaRPr b="0" lang="de-DE" sz="1800" spc="-1" strike="noStrike">
               <a:latin typeface="Arial"/>
-              <a:ea typeface="Noto Sans CJK SC"/>
-            </a:endParaRPr>
-          </a:p>
-          <a:p>
-            <a:pPr lvl="1" marL="432000" indent="-214920">
+            </a:endParaRPr>
+          </a:p>
+          <a:p>
+            <a:pPr lvl="1" marL="432000" indent="-214560">
               <a:lnSpc>
                 <a:spcPct val="100000"/>
               </a:lnSpc>
@@ -13642,11 +13635,10 @@
             </a:r>
             <a:endParaRPr b="0" lang="de-DE" sz="1800" spc="-1" strike="noStrike">
               <a:latin typeface="Arial"/>
-              <a:ea typeface="Noto Sans CJK SC"/>
-            </a:endParaRPr>
-          </a:p>
-          <a:p>
-            <a:pPr lvl="1" marL="432000" indent="-214920">
+            </a:endParaRPr>
+          </a:p>
+          <a:p>
+            <a:pPr lvl="1" marL="432000" indent="-214560">
               <a:lnSpc>
                 <a:spcPct val="100000"/>
               </a:lnSpc>
@@ -13675,11 +13667,10 @@
             </a:r>
             <a:endParaRPr b="0" lang="de-DE" sz="1800" spc="-1" strike="noStrike">
               <a:latin typeface="Arial"/>
-              <a:ea typeface="Noto Sans CJK SC"/>
-            </a:endParaRPr>
-          </a:p>
-          <a:p>
-            <a:pPr lvl="2" marL="648000" indent="-214920">
+            </a:endParaRPr>
+          </a:p>
+          <a:p>
+            <a:pPr lvl="2" marL="648000" indent="-214560">
               <a:lnSpc>
                 <a:spcPct val="100000"/>
               </a:lnSpc>
@@ -13708,11 +13699,10 @@
             </a:r>
             <a:endParaRPr b="0" lang="de-DE" sz="1800" spc="-1" strike="noStrike">
               <a:latin typeface="Arial"/>
-              <a:ea typeface="Noto Sans CJK SC"/>
-            </a:endParaRPr>
-          </a:p>
-          <a:p>
-            <a:pPr lvl="2" marL="648000" indent="-214920">
+            </a:endParaRPr>
+          </a:p>
+          <a:p>
+            <a:pPr lvl="2" marL="648000" indent="-214560">
               <a:lnSpc>
                 <a:spcPct val="100000"/>
               </a:lnSpc>
@@ -13741,11 +13731,10 @@
             </a:r>
             <a:endParaRPr b="0" lang="de-DE" sz="1800" spc="-1" strike="noStrike">
               <a:latin typeface="Arial"/>
-              <a:ea typeface="Noto Sans CJK SC"/>
-            </a:endParaRPr>
-          </a:p>
-          <a:p>
-            <a:pPr lvl="1" marL="432000" indent="-214920">
+            </a:endParaRPr>
+          </a:p>
+          <a:p>
+            <a:pPr lvl="1" marL="432000" indent="-214560">
               <a:lnSpc>
                 <a:spcPct val="100000"/>
               </a:lnSpc>
@@ -13774,7 +13763,6 @@
             </a:r>
             <a:endParaRPr b="0" lang="de-DE" sz="1800" spc="-1" strike="noStrike">
               <a:latin typeface="Arial"/>
-              <a:ea typeface="Noto Sans CJK SC"/>
             </a:endParaRPr>
           </a:p>
           <a:p>
@@ -13810,7 +13798,7 @@
                   <p:par>
                     <p:cTn id="3" fill="hold">
                       <p:stCondLst>
-                        <p:cond delay="0"/>
+                        <p:cond delay="indefinite"/>
                       </p:stCondLst>
                       <p:childTnLst>
                         <p:par>
@@ -13820,7 +13808,7 @@
                             </p:stCondLst>
                             <p:childTnLst>
                               <p:par>
-                                <p:cTn id="5" nodeType="withEffect" fill="hold" presetClass="entr" presetID="1">
+                                <p:cTn id="5" nodeType="clickEffect" fill="hold" presetClass="entr" presetID="1">
                                   <p:stCondLst>
                                     <p:cond delay="0"/>
                                   </p:stCondLst>
@@ -13833,7 +13821,11 @@
                                           </p:stCondLst>
                                         </p:cTn>
                                         <p:tgtEl>
-                                          <p:spTgt spid="312"/>
+                                          <p:spTgt spid="319">
+                                            <p:txEl>
+                                              <p:pRg st="0" end="0"/>
+                                            </p:txEl>
+                                          </p:spTgt>
                                         </p:tgtEl>
                                         <p:attrNameLst>
                                           <p:attrName>style.visibility</p:attrName>
@@ -13846,21 +13838,43 @@
                                   </p:childTnLst>
                                 </p:cTn>
                               </p:par>
+                            </p:childTnLst>
+                          </p:cTn>
+                        </p:par>
+                      </p:childTnLst>
+                    </p:cTn>
+                  </p:par>
+                  <p:par>
+                    <p:cTn id="7" fill="hold">
+                      <p:stCondLst>
+                        <p:cond delay="indefinite"/>
+                      </p:stCondLst>
+                      <p:childTnLst>
+                        <p:par>
+                          <p:cTn id="8" fill="hold">
+                            <p:stCondLst>
+                              <p:cond delay="0"/>
+                            </p:stCondLst>
+                            <p:childTnLst>
                               <p:par>
-                                <p:cTn id="7" nodeType="withEffect" fill="hold" presetClass="entr" presetID="1">
+                                <p:cTn id="9" nodeType="clickEffect" fill="hold" presetClass="entr" presetID="1">
                                   <p:stCondLst>
                                     <p:cond delay="0"/>
                                   </p:stCondLst>
                                   <p:childTnLst>
                                     <p:set>
                                       <p:cBhvr>
-                                        <p:cTn id="8" dur="1" fill="hold">
+                                        <p:cTn id="10" dur="1" fill="hold">
                                           <p:stCondLst>
                                             <p:cond delay="0"/>
                                           </p:stCondLst>
                                         </p:cTn>
                                         <p:tgtEl>
-                                          <p:spTgt spid="313"/>
+                                          <p:spTgt spid="319">
+                                            <p:txEl>
+                                              <p:pRg st="1" end="1"/>
+                                            </p:txEl>
+                                          </p:spTgt>
                                         </p:tgtEl>
                                         <p:attrNameLst>
                                           <p:attrName>style.visibility</p:attrName>
@@ -13873,21 +13887,43 @@
                                   </p:childTnLst>
                                 </p:cTn>
                               </p:par>
+                            </p:childTnLst>
+                          </p:cTn>
+                        </p:par>
+                      </p:childTnLst>
+                    </p:cTn>
+                  </p:par>
+                  <p:par>
+                    <p:cTn id="11" fill="hold">
+                      <p:stCondLst>
+                        <p:cond delay="indefinite"/>
+                      </p:stCondLst>
+                      <p:childTnLst>
+                        <p:par>
+                          <p:cTn id="12" fill="hold">
+                            <p:stCondLst>
+                              <p:cond delay="0"/>
+                            </p:stCondLst>
+                            <p:childTnLst>
                               <p:par>
-                                <p:cTn id="9" nodeType="withEffect" fill="hold" presetClass="entr" presetID="1">
+                                <p:cTn id="13" nodeType="clickEffect" fill="hold" presetClass="entr" presetID="1">
                                   <p:stCondLst>
                                     <p:cond delay="0"/>
                                   </p:stCondLst>
                                   <p:childTnLst>
                                     <p:set>
                                       <p:cBhvr>
-                                        <p:cTn id="10" dur="1" fill="hold">
+                                        <p:cTn id="14" dur="1" fill="hold">
                                           <p:stCondLst>
                                             <p:cond delay="0"/>
                                           </p:stCondLst>
                                         </p:cTn>
                                         <p:tgtEl>
-                                          <p:spTgt spid="318"/>
+                                          <p:spTgt spid="319">
+                                            <p:txEl>
+                                              <p:pRg st="2" end="2"/>
+                                            </p:txEl>
+                                          </p:spTgt>
                                         </p:tgtEl>
                                         <p:attrNameLst>
                                           <p:attrName>style.visibility</p:attrName>
@@ -13900,21 +13936,190 @@
                                   </p:childTnLst>
                                 </p:cTn>
                               </p:par>
+                            </p:childTnLst>
+                          </p:cTn>
+                        </p:par>
+                      </p:childTnLst>
+                    </p:cTn>
+                  </p:par>
+                  <p:par>
+                    <p:cTn id="15" fill="hold">
+                      <p:stCondLst>
+                        <p:cond delay="indefinite"/>
+                      </p:stCondLst>
+                      <p:childTnLst>
+                        <p:par>
+                          <p:cTn id="16" fill="hold">
+                            <p:stCondLst>
+                              <p:cond delay="0"/>
+                            </p:stCondLst>
+                            <p:childTnLst>
                               <p:par>
-                                <p:cTn id="11" nodeType="withEffect" fill="hold" presetClass="entr" presetID="1">
+                                <p:cTn id="17" nodeType="clickEffect" fill="hold" presetClass="entr" presetID="1">
                                   <p:stCondLst>
                                     <p:cond delay="0"/>
                                   </p:stCondLst>
                                   <p:childTnLst>
                                     <p:set>
                                       <p:cBhvr>
-                                        <p:cTn id="12" dur="1" fill="hold">
+                                        <p:cTn id="18" dur="1" fill="hold">
                                           <p:stCondLst>
                                             <p:cond delay="0"/>
                                           </p:stCondLst>
                                         </p:cTn>
                                         <p:tgtEl>
-                                          <p:spTgt spid="314"/>
+                                          <p:spTgt spid="319">
+                                            <p:txEl>
+                                              <p:pRg st="3" end="3"/>
+                                            </p:txEl>
+                                          </p:spTgt>
+                                        </p:tgtEl>
+                                        <p:attrNameLst>
+                                          <p:attrName>style.visibility</p:attrName>
+                                        </p:attrNameLst>
+                                      </p:cBhvr>
+                                      <p:to>
+                                        <p:strVal val="visible"/>
+                                      </p:to>
+                                    </p:set>
+                                  </p:childTnLst>
+                                </p:cTn>
+                              </p:par>
+                            </p:childTnLst>
+                          </p:cTn>
+                        </p:par>
+                      </p:childTnLst>
+                    </p:cTn>
+                  </p:par>
+                  <p:par>
+                    <p:cTn id="19" fill="hold">
+                      <p:stCondLst>
+                        <p:cond delay="indefinite"/>
+                      </p:stCondLst>
+                      <p:childTnLst>
+                        <p:par>
+                          <p:cTn id="20" fill="hold">
+                            <p:stCondLst>
+                              <p:cond delay="0"/>
+                            </p:stCondLst>
+                            <p:childTnLst>
+                              <p:par>
+                                <p:cTn id="21" nodeType="clickEffect" fill="hold" presetClass="entr" presetID="1">
+                                  <p:stCondLst>
+                                    <p:cond delay="0"/>
+                                  </p:stCondLst>
+                                  <p:childTnLst>
+                                    <p:set>
+                                      <p:cBhvr>
+                                        <p:cTn id="22" dur="1" fill="hold">
+                                          <p:stCondLst>
+                                            <p:cond delay="0"/>
+                                          </p:stCondLst>
+                                        </p:cTn>
+                                        <p:tgtEl>
+                                          <p:spTgt spid="319">
+                                            <p:txEl>
+                                              <p:pRg st="4" end="4"/>
+                                            </p:txEl>
+                                          </p:spTgt>
+                                        </p:tgtEl>
+                                        <p:attrNameLst>
+                                          <p:attrName>style.visibility</p:attrName>
+                                        </p:attrNameLst>
+                                      </p:cBhvr>
+                                      <p:to>
+                                        <p:strVal val="visible"/>
+                                      </p:to>
+                                    </p:set>
+                                  </p:childTnLst>
+                                </p:cTn>
+                              </p:par>
+                            </p:childTnLst>
+                          </p:cTn>
+                        </p:par>
+                      </p:childTnLst>
+                    </p:cTn>
+                  </p:par>
+                  <p:par>
+                    <p:cTn id="23" fill="hold">
+                      <p:stCondLst>
+                        <p:cond delay="indefinite"/>
+                      </p:stCondLst>
+                      <p:childTnLst>
+                        <p:par>
+                          <p:cTn id="24" fill="hold">
+                            <p:stCondLst>
+                              <p:cond delay="0"/>
+                            </p:stCondLst>
+                            <p:childTnLst>
+                              <p:par>
+                                <p:cTn id="25" nodeType="clickEffect" fill="hold" presetClass="entr" presetID="1">
+                                  <p:stCondLst>
+                                    <p:cond delay="0"/>
+                                  </p:stCondLst>
+                                  <p:childTnLst>
+                                    <p:set>
+                                      <p:cBhvr>
+                                        <p:cTn id="26" dur="1" fill="hold">
+                                          <p:stCondLst>
+                                            <p:cond delay="0"/>
+                                          </p:stCondLst>
+                                        </p:cTn>
+                                        <p:tgtEl>
+                                          <p:spTgt spid="319">
+                                            <p:txEl>
+                                              <p:pRg st="5" end="5"/>
+                                            </p:txEl>
+                                          </p:spTgt>
+                                        </p:tgtEl>
+                                        <p:attrNameLst>
+                                          <p:attrName>style.visibility</p:attrName>
+                                        </p:attrNameLst>
+                                      </p:cBhvr>
+                                      <p:to>
+                                        <p:strVal val="visible"/>
+                                      </p:to>
+                                    </p:set>
+                                  </p:childTnLst>
+                                </p:cTn>
+                              </p:par>
+                            </p:childTnLst>
+                          </p:cTn>
+                        </p:par>
+                      </p:childTnLst>
+                    </p:cTn>
+                  </p:par>
+                  <p:par>
+                    <p:cTn id="27" fill="hold">
+                      <p:stCondLst>
+                        <p:cond delay="indefinite"/>
+                      </p:stCondLst>
+                      <p:childTnLst>
+                        <p:par>
+                          <p:cTn id="28" fill="hold">
+                            <p:stCondLst>
+                              <p:cond delay="0"/>
+                            </p:stCondLst>
+                            <p:childTnLst>
+                              <p:par>
+                                <p:cTn id="29" nodeType="clickEffect" fill="hold" presetClass="entr" presetID="1">
+                                  <p:stCondLst>
+                                    <p:cond delay="0"/>
+                                  </p:stCondLst>
+                                  <p:childTnLst>
+                                    <p:set>
+                                      <p:cBhvr>
+                                        <p:cTn id="30" dur="1" fill="hold">
+                                          <p:stCondLst>
+                                            <p:cond delay="0"/>
+                                          </p:stCondLst>
+                                        </p:cTn>
+                                        <p:tgtEl>
+                                          <p:spTgt spid="319">
+                                            <p:txEl>
+                                              <p:pRg st="6" end="6"/>
+                                            </p:txEl>
+                                          </p:spTgt>
                                         </p:tgtEl>
                                         <p:attrNameLst>
                                           <p:attrName>style.visibility</p:attrName>
@@ -13984,7 +14189,7 @@
         <p:spPr>
           <a:xfrm>
             <a:off x="609480" y="273600"/>
-            <a:ext cx="10971360" cy="1143720"/>
+            <a:ext cx="10971000" cy="1143360"/>
           </a:xfrm>
           <a:prstGeom prst="rect">
             <a:avLst/>
@@ -14041,7 +14246,7 @@
         <p:spPr>
           <a:xfrm>
             <a:off x="6034320" y="3339360"/>
-            <a:ext cx="179640" cy="231480"/>
+            <a:ext cx="179280" cy="231120"/>
           </a:xfrm>
           <a:prstGeom prst="rect">
             <a:avLst/>
@@ -14071,7 +14276,7 @@
         <p:spPr>
           <a:xfrm>
             <a:off x="23400" y="1076400"/>
-            <a:ext cx="12187080" cy="5817960"/>
+            <a:ext cx="12186720" cy="5817600"/>
           </a:xfrm>
           <a:prstGeom prst="rect">
             <a:avLst/>
@@ -14120,7 +14325,7 @@
         <p:spPr>
           <a:xfrm>
             <a:off x="609480" y="273600"/>
-            <a:ext cx="10971360" cy="1143720"/>
+            <a:ext cx="10971000" cy="1143360"/>
           </a:xfrm>
           <a:prstGeom prst="rect">
             <a:avLst/>
@@ -14170,8 +14375,8 @@
         </p:nvSpPr>
         <p:spPr>
           <a:xfrm>
-            <a:off x="609480" y="1604520"/>
-            <a:ext cx="10971360" cy="3976200"/>
+            <a:off x="549000" y="2340000"/>
+            <a:ext cx="10971000" cy="2340000"/>
           </a:xfrm>
           <a:prstGeom prst="rect">
             <a:avLst/>
@@ -14192,42 +14397,54 @@
             <a:noAutofit/>
           </a:bodyPr>
           <a:p>
-            <a:pPr algn="ctr">
+            <a:pPr lvl="1" marL="432000" indent="-216000" algn="ctr">
               <a:lnSpc>
                 <a:spcPct val="100000"/>
               </a:lnSpc>
+              <a:buClr>
+                <a:srgbClr val="000000"/>
+              </a:buClr>
+              <a:buSzPct val="45000"/>
+              <a:buFont typeface="Wingdings" charset="2"/>
+              <a:buChar char=""/>
             </a:pPr>
             <a:r>
-              <a:rPr b="0" lang="de-DE" sz="3200" spc="-1" strike="noStrike">
+              <a:rPr b="0" lang="de-DE" sz="2400" spc="-1" strike="noStrike">
                 <a:solidFill>
                   <a:srgbClr val="000000"/>
                 </a:solidFill>
                 <a:latin typeface="Arial"/>
                 <a:ea typeface="DejaVu Sans"/>
               </a:rPr>
-              <a:t>- Video kompletterDurchlauf.mp4 abspielen</a:t>
+              <a:t>Video kompletterDurchlauf.mp4 abspielen</a:t>
             </a:r>
-            <a:endParaRPr b="0" lang="de-DE" sz="3200" spc="-1" strike="noStrike">
-              <a:latin typeface="Arial"/>
-            </a:endParaRPr>
-          </a:p>
-          <a:p>
-            <a:pPr algn="ctr">
+            <a:endParaRPr b="0" lang="de-DE" sz="2400" spc="-1" strike="noStrike">
+              <a:latin typeface="Arial"/>
+            </a:endParaRPr>
+          </a:p>
+          <a:p>
+            <a:pPr lvl="1" marL="432000" indent="-216000" algn="ctr">
               <a:lnSpc>
                 <a:spcPct val="100000"/>
               </a:lnSpc>
+              <a:buClr>
+                <a:srgbClr val="000000"/>
+              </a:buClr>
+              <a:buSzPct val="45000"/>
+              <a:buFont typeface="Wingdings" charset="2"/>
+              <a:buChar char=""/>
             </a:pPr>
             <a:r>
-              <a:rPr b="0" lang="de-DE" sz="3200" spc="-1" strike="noStrike">
+              <a:rPr b="0" lang="de-DE" sz="2400" spc="-1" strike="noStrike">
                 <a:solidFill>
                   <a:srgbClr val="000000"/>
                 </a:solidFill>
                 <a:latin typeface="Arial"/>
                 <a:ea typeface="DejaVu Sans"/>
               </a:rPr>
-              <a:t>- Video timerLäuftAb.mp4 abspielen</a:t>
+              <a:t>Video timerLäuftAb.mp4 abspielen </a:t>
             </a:r>
-            <a:endParaRPr b="0" lang="de-DE" sz="3200" spc="-1" strike="noStrike">
+            <a:endParaRPr b="0" lang="de-DE" sz="2400" spc="-1" strike="noStrike">
               <a:latin typeface="Arial"/>
             </a:endParaRPr>
           </a:p>
@@ -14243,6 +14460,161 @@
       <p:transition spd="slow"/>
     </mc:Fallback>
   </mc:AlternateContent>
+  <p:timing>
+    <p:tnLst>
+      <p:par>
+        <p:cTn id="31" dur="indefinite" restart="never" nodeType="tmRoot">
+          <p:childTnLst>
+            <p:seq>
+              <p:cTn id="32" dur="indefinite" nodeType="mainSeq">
+                <p:childTnLst>
+                  <p:par>
+                    <p:cTn id="33" fill="hold">
+                      <p:stCondLst>
+                        <p:cond delay="indefinite"/>
+                      </p:stCondLst>
+                      <p:childTnLst>
+                        <p:par>
+                          <p:cTn id="34" fill="hold">
+                            <p:stCondLst>
+                              <p:cond delay="0"/>
+                            </p:stCondLst>
+                            <p:childTnLst>
+                              <p:par>
+                                <p:cTn id="35" nodeType="clickEffect" fill="hold" presetClass="entr" presetID="1">
+                                  <p:stCondLst>
+                                    <p:cond delay="0"/>
+                                  </p:stCondLst>
+                                  <p:childTnLst>
+                                    <p:set>
+                                      <p:cBhvr>
+                                        <p:cTn id="36" dur="1" fill="hold">
+                                          <p:stCondLst>
+                                            <p:cond delay="0"/>
+                                          </p:stCondLst>
+                                        </p:cTn>
+                                        <p:tgtEl>
+                                          <p:spTgt spid="324"/>
+                                        </p:tgtEl>
+                                        <p:attrNameLst>
+                                          <p:attrName>style.visibility</p:attrName>
+                                        </p:attrNameLst>
+                                      </p:cBhvr>
+                                      <p:to>
+                                        <p:strVal val="visible"/>
+                                      </p:to>
+                                    </p:set>
+                                  </p:childTnLst>
+                                </p:cTn>
+                              </p:par>
+                              <p:par>
+                                <p:cTn id="37" nodeType="withEffect" fill="hold" presetClass="entr" presetID="1">
+                                  <p:stCondLst>
+                                    <p:cond delay="0"/>
+                                  </p:stCondLst>
+                                  <p:childTnLst>
+                                    <p:set>
+                                      <p:cBhvr>
+                                        <p:cTn id="38" dur="1" fill="hold">
+                                          <p:stCondLst>
+                                            <p:cond delay="0"/>
+                                          </p:stCondLst>
+                                        </p:cTn>
+                                        <p:tgtEl>
+                                          <p:spTgt spid="324">
+                                            <p:txEl>
+                                              <p:pRg st="0" end="0"/>
+                                            </p:txEl>
+                                          </p:spTgt>
+                                        </p:tgtEl>
+                                        <p:attrNameLst>
+                                          <p:attrName>style.visibility</p:attrName>
+                                        </p:attrNameLst>
+                                      </p:cBhvr>
+                                      <p:to>
+                                        <p:strVal val="visible"/>
+                                      </p:to>
+                                    </p:set>
+                                  </p:childTnLst>
+                                </p:cTn>
+                              </p:par>
+                            </p:childTnLst>
+                          </p:cTn>
+                        </p:par>
+                      </p:childTnLst>
+                    </p:cTn>
+                  </p:par>
+                  <p:par>
+                    <p:cTn id="39" fill="hold">
+                      <p:stCondLst>
+                        <p:cond delay="indefinite"/>
+                      </p:stCondLst>
+                      <p:childTnLst>
+                        <p:par>
+                          <p:cTn id="40" fill="hold">
+                            <p:stCondLst>
+                              <p:cond delay="0"/>
+                            </p:stCondLst>
+                            <p:childTnLst>
+                              <p:par>
+                                <p:cTn id="41" nodeType="clickEffect" fill="hold" presetClass="entr" presetID="1">
+                                  <p:stCondLst>
+                                    <p:cond delay="0"/>
+                                  </p:stCondLst>
+                                  <p:childTnLst>
+                                    <p:set>
+                                      <p:cBhvr>
+                                        <p:cTn id="42" dur="1" fill="hold">
+                                          <p:stCondLst>
+                                            <p:cond delay="0"/>
+                                          </p:stCondLst>
+                                        </p:cTn>
+                                        <p:tgtEl>
+                                          <p:spTgt spid="324">
+                                            <p:txEl>
+                                              <p:pRg st="1" end="1"/>
+                                            </p:txEl>
+                                          </p:spTgt>
+                                        </p:tgtEl>
+                                        <p:attrNameLst>
+                                          <p:attrName>style.visibility</p:attrName>
+                                        </p:attrNameLst>
+                                      </p:cBhvr>
+                                      <p:to>
+                                        <p:strVal val="visible"/>
+                                      </p:to>
+                                    </p:set>
+                                  </p:childTnLst>
+                                </p:cTn>
+                              </p:par>
+                            </p:childTnLst>
+                          </p:cTn>
+                        </p:par>
+                      </p:childTnLst>
+                    </p:cTn>
+                  </p:par>
+                </p:childTnLst>
+              </p:cTn>
+              <p:prevCondLst>
+                <p:cond evt="onPrev">
+                  <p:tgtEl>
+                    <p:sldTgt/>
+                  </p:tgtEl>
+                </p:cond>
+              </p:prevCondLst>
+              <p:nextCondLst>
+                <p:cond evt="onNext">
+                  <p:tgtEl>
+                    <p:sldTgt/>
+                  </p:tgtEl>
+                </p:cond>
+              </p:nextCondLst>
+            </p:seq>
+          </p:childTnLst>
+        </p:cTn>
+      </p:par>
+    </p:tnLst>
+  </p:timing>
 </p:sld>
 </file>
 
@@ -14272,7 +14644,7 @@
         <p:spPr>
           <a:xfrm>
             <a:off x="329040" y="1798200"/>
-            <a:ext cx="7231320" cy="3296160"/>
+            <a:ext cx="7230960" cy="3295800"/>
           </a:xfrm>
           <a:prstGeom prst="rect">
             <a:avLst/>
@@ -14309,7 +14681,7 @@
             </a:endParaRPr>
           </a:p>
           <a:p>
-            <a:pPr marL="457200" indent="-297000">
+            <a:pPr marL="457200" indent="-296640">
               <a:lnSpc>
                 <a:spcPct val="90000"/>
               </a:lnSpc>
@@ -14340,7 +14712,7 @@
             </a:endParaRPr>
           </a:p>
           <a:p>
-            <a:pPr marL="457200" indent="-297000">
+            <a:pPr marL="457200" indent="-296640">
               <a:lnSpc>
                 <a:spcPct val="90000"/>
               </a:lnSpc>
@@ -14371,7 +14743,7 @@
             </a:endParaRPr>
           </a:p>
           <a:p>
-            <a:pPr marL="457200" indent="-297000">
+            <a:pPr marL="457200" indent="-296640">
               <a:lnSpc>
                 <a:spcPct val="90000"/>
               </a:lnSpc>
@@ -14402,7 +14774,7 @@
             </a:endParaRPr>
           </a:p>
           <a:p>
-            <a:pPr marL="457200" indent="-297000">
+            <a:pPr marL="457200" indent="-296640">
               <a:lnSpc>
                 <a:spcPct val="90000"/>
               </a:lnSpc>
@@ -14466,7 +14838,7 @@
         <p:spPr>
           <a:xfrm>
             <a:off x="7526160" y="471600"/>
-            <a:ext cx="4421160" cy="5476320"/>
+            <a:ext cx="4420800" cy="5475960"/>
           </a:xfrm>
           <a:prstGeom prst="rect">
             <a:avLst/>
@@ -14485,7 +14857,7 @@
         <p:spPr>
           <a:xfrm>
             <a:off x="512640" y="253080"/>
-            <a:ext cx="6506280" cy="1143360"/>
+            <a:ext cx="6505920" cy="1143000"/>
           </a:xfrm>
           <a:prstGeom prst="rect">
             <a:avLst/>
@@ -14540,6 +14912,259 @@
       <p:transition spd="slow"/>
     </mc:Fallback>
   </mc:AlternateContent>
+  <p:timing>
+    <p:tnLst>
+      <p:par>
+        <p:cTn id="43" dur="indefinite" restart="never" nodeType="tmRoot">
+          <p:childTnLst>
+            <p:seq>
+              <p:cTn id="44" dur="indefinite" nodeType="mainSeq">
+                <p:childTnLst>
+                  <p:par>
+                    <p:cTn id="45" fill="hold">
+                      <p:stCondLst>
+                        <p:cond delay="indefinite"/>
+                      </p:stCondLst>
+                      <p:childTnLst>
+                        <p:par>
+                          <p:cTn id="46" fill="hold">
+                            <p:stCondLst>
+                              <p:cond delay="0"/>
+                            </p:stCondLst>
+                            <p:childTnLst>
+                              <p:par>
+                                <p:cTn id="47" nodeType="clickEffect" fill="hold" presetClass="entr" presetID="1">
+                                  <p:stCondLst>
+                                    <p:cond delay="0"/>
+                                  </p:stCondLst>
+                                  <p:childTnLst>
+                                    <p:set>
+                                      <p:cBhvr>
+                                        <p:cTn id="48" dur="1" fill="hold">
+                                          <p:stCondLst>
+                                            <p:cond delay="0"/>
+                                          </p:stCondLst>
+                                        </p:cTn>
+                                        <p:tgtEl>
+                                          <p:spTgt spid="325"/>
+                                        </p:tgtEl>
+                                        <p:attrNameLst>
+                                          <p:attrName>style.visibility</p:attrName>
+                                        </p:attrNameLst>
+                                      </p:cBhvr>
+                                      <p:to>
+                                        <p:strVal val="visible"/>
+                                      </p:to>
+                                    </p:set>
+                                  </p:childTnLst>
+                                </p:cTn>
+                              </p:par>
+                              <p:par>
+                                <p:cTn id="49" nodeType="withEffect" fill="hold" presetClass="entr" presetID="1">
+                                  <p:stCondLst>
+                                    <p:cond delay="0"/>
+                                  </p:stCondLst>
+                                  <p:childTnLst>
+                                    <p:set>
+                                      <p:cBhvr>
+                                        <p:cTn id="50" dur="1" fill="hold">
+                                          <p:stCondLst>
+                                            <p:cond delay="0"/>
+                                          </p:stCondLst>
+                                        </p:cTn>
+                                        <p:tgtEl>
+                                          <p:spTgt spid="325">
+                                            <p:txEl>
+                                              <p:pRg st="1" end="1"/>
+                                            </p:txEl>
+                                          </p:spTgt>
+                                        </p:tgtEl>
+                                        <p:attrNameLst>
+                                          <p:attrName>style.visibility</p:attrName>
+                                        </p:attrNameLst>
+                                      </p:cBhvr>
+                                      <p:to>
+                                        <p:strVal val="visible"/>
+                                      </p:to>
+                                    </p:set>
+                                  </p:childTnLst>
+                                </p:cTn>
+                              </p:par>
+                            </p:childTnLst>
+                          </p:cTn>
+                        </p:par>
+                      </p:childTnLst>
+                    </p:cTn>
+                  </p:par>
+                  <p:par>
+                    <p:cTn id="51" fill="hold">
+                      <p:stCondLst>
+                        <p:cond delay="indefinite"/>
+                      </p:stCondLst>
+                      <p:childTnLst>
+                        <p:par>
+                          <p:cTn id="52" fill="hold">
+                            <p:stCondLst>
+                              <p:cond delay="0"/>
+                            </p:stCondLst>
+                            <p:childTnLst>
+                              <p:par>
+                                <p:cTn id="53" nodeType="clickEffect" fill="hold" presetClass="entr" presetID="1">
+                                  <p:stCondLst>
+                                    <p:cond delay="0"/>
+                                  </p:stCondLst>
+                                  <p:childTnLst>
+                                    <p:set>
+                                      <p:cBhvr>
+                                        <p:cTn id="54" dur="1" fill="hold">
+                                          <p:stCondLst>
+                                            <p:cond delay="0"/>
+                                          </p:stCondLst>
+                                        </p:cTn>
+                                        <p:tgtEl>
+                                          <p:spTgt spid="325">
+                                            <p:txEl>
+                                              <p:pRg st="2" end="2"/>
+                                            </p:txEl>
+                                          </p:spTgt>
+                                        </p:tgtEl>
+                                        <p:attrNameLst>
+                                          <p:attrName>style.visibility</p:attrName>
+                                        </p:attrNameLst>
+                                      </p:cBhvr>
+                                      <p:to>
+                                        <p:strVal val="visible"/>
+                                      </p:to>
+                                    </p:set>
+                                  </p:childTnLst>
+                                </p:cTn>
+                              </p:par>
+                            </p:childTnLst>
+                          </p:cTn>
+                        </p:par>
+                      </p:childTnLst>
+                    </p:cTn>
+                  </p:par>
+                  <p:par>
+                    <p:cTn id="55" fill="hold">
+                      <p:stCondLst>
+                        <p:cond delay="indefinite"/>
+                      </p:stCondLst>
+                      <p:childTnLst>
+                        <p:par>
+                          <p:cTn id="56" fill="hold">
+                            <p:stCondLst>
+                              <p:cond delay="0"/>
+                            </p:stCondLst>
+                            <p:childTnLst>
+                              <p:par>
+                                <p:cTn id="57" nodeType="clickEffect" fill="hold" presetClass="entr" presetID="1">
+                                  <p:stCondLst>
+                                    <p:cond delay="0"/>
+                                  </p:stCondLst>
+                                  <p:childTnLst>
+                                    <p:set>
+                                      <p:cBhvr>
+                                        <p:cTn id="58" dur="1" fill="hold">
+                                          <p:stCondLst>
+                                            <p:cond delay="0"/>
+                                          </p:stCondLst>
+                                        </p:cTn>
+                                        <p:tgtEl>
+                                          <p:spTgt spid="325">
+                                            <p:txEl>
+                                              <p:pRg st="3" end="3"/>
+                                            </p:txEl>
+                                          </p:spTgt>
+                                        </p:tgtEl>
+                                        <p:attrNameLst>
+                                          <p:attrName>style.visibility</p:attrName>
+                                        </p:attrNameLst>
+                                      </p:cBhvr>
+                                      <p:to>
+                                        <p:strVal val="visible"/>
+                                      </p:to>
+                                    </p:set>
+                                  </p:childTnLst>
+                                </p:cTn>
+                              </p:par>
+                            </p:childTnLst>
+                          </p:cTn>
+                        </p:par>
+                      </p:childTnLst>
+                    </p:cTn>
+                  </p:par>
+                  <p:par>
+                    <p:cTn id="59" fill="hold">
+                      <p:stCondLst>
+                        <p:cond delay="indefinite"/>
+                      </p:stCondLst>
+                      <p:childTnLst>
+                        <p:par>
+                          <p:cTn id="60" fill="hold">
+                            <p:stCondLst>
+                              <p:cond delay="0"/>
+                            </p:stCondLst>
+                            <p:childTnLst>
+                              <p:par>
+                                <p:cTn id="61" nodeType="clickEffect" fill="hold" presetClass="entr" presetID="1">
+                                  <p:stCondLst>
+                                    <p:cond delay="0"/>
+                                  </p:stCondLst>
+                                  <p:childTnLst>
+                                    <p:set>
+                                      <p:cBhvr>
+                                        <p:cTn id="62" dur="1" fill="hold">
+                                          <p:stCondLst>
+                                            <p:cond delay="0"/>
+                                          </p:stCondLst>
+                                        </p:cTn>
+                                        <p:tgtEl>
+                                          <p:spTgt spid="325">
+                                            <p:txEl>
+                                              <p:pRg st="4" end="4"/>
+                                            </p:txEl>
+                                          </p:spTgt>
+                                        </p:tgtEl>
+                                        <p:attrNameLst>
+                                          <p:attrName>style.visibility</p:attrName>
+                                        </p:attrNameLst>
+                                      </p:cBhvr>
+                                      <p:to>
+                                        <p:strVal val="visible"/>
+                                      </p:to>
+                                    </p:set>
+                                  </p:childTnLst>
+                                </p:cTn>
+                              </p:par>
+                            </p:childTnLst>
+                          </p:cTn>
+                        </p:par>
+                      </p:childTnLst>
+                    </p:cTn>
+                  </p:par>
+                </p:childTnLst>
+              </p:cTn>
+              <p:prevCondLst>
+                <p:cond evt="onPrev">
+                  <p:tgtEl>
+                    <p:sldTgt/>
+                  </p:tgtEl>
+                </p:cond>
+              </p:prevCondLst>
+              <p:nextCondLst>
+                <p:cond evt="onNext">
+                  <p:tgtEl>
+                    <p:sldTgt/>
+                  </p:tgtEl>
+                </p:cond>
+              </p:nextCondLst>
+            </p:seq>
+          </p:childTnLst>
+        </p:cTn>
+      </p:par>
+    </p:tnLst>
+  </p:timing>
 </p:sld>
 </file>
 
@@ -14573,7 +15198,7 @@
         <p:spPr>
           <a:xfrm>
             <a:off x="4384800" y="1304280"/>
-            <a:ext cx="7672680" cy="5029200"/>
+            <a:ext cx="7672320" cy="5028840"/>
           </a:xfrm>
           <a:prstGeom prst="rect">
             <a:avLst/>
@@ -14592,7 +15217,7 @@
         <p:spPr>
           <a:xfrm>
             <a:off x="36000" y="620280"/>
-            <a:ext cx="4347720" cy="6252840"/>
+            <a:ext cx="4347360" cy="6252840"/>
           </a:xfrm>
           <a:prstGeom prst="rect">
             <a:avLst/>
@@ -14629,7 +15254,7 @@
             </a:endParaRPr>
           </a:p>
           <a:p>
-            <a:pPr marL="457200" indent="-297000">
+            <a:pPr marL="457200" indent="-296640">
               <a:lnSpc>
                 <a:spcPct val="90000"/>
               </a:lnSpc>
@@ -14660,7 +15285,7 @@
             </a:endParaRPr>
           </a:p>
           <a:p>
-            <a:pPr marL="457200" indent="-297000">
+            <a:pPr marL="457200" indent="-296640">
               <a:lnSpc>
                 <a:spcPct val="90000"/>
               </a:lnSpc>
@@ -14691,7 +15316,7 @@
             </a:endParaRPr>
           </a:p>
           <a:p>
-            <a:pPr marL="457200" indent="-297000">
+            <a:pPr marL="457200" indent="-296640">
               <a:lnSpc>
                 <a:spcPct val="90000"/>
               </a:lnSpc>
@@ -14722,7 +15347,7 @@
             </a:endParaRPr>
           </a:p>
           <a:p>
-            <a:pPr marL="457200" indent="-297000">
+            <a:pPr marL="457200" indent="-296640">
               <a:lnSpc>
                 <a:spcPct val="90000"/>
               </a:lnSpc>
@@ -14753,7 +15378,7 @@
             </a:endParaRPr>
           </a:p>
           <a:p>
-            <a:pPr marL="457200" indent="-297000">
+            <a:pPr marL="457200" indent="-296640">
               <a:lnSpc>
                 <a:spcPct val="90000"/>
               </a:lnSpc>
@@ -14813,7 +15438,7 @@
         <p:spPr>
           <a:xfrm>
             <a:off x="1080000" y="180000"/>
-            <a:ext cx="7018920" cy="557280"/>
+            <a:ext cx="7018560" cy="556920"/>
           </a:xfrm>
           <a:prstGeom prst="rect">
             <a:avLst/>
@@ -14865,6 +15490,308 @@
       <p:transition spd="slow"/>
     </mc:Fallback>
   </mc:AlternateContent>
+  <p:timing>
+    <p:tnLst>
+      <p:par>
+        <p:cTn id="63" dur="indefinite" restart="never" nodeType="tmRoot">
+          <p:childTnLst>
+            <p:seq>
+              <p:cTn id="64" dur="indefinite" nodeType="mainSeq">
+                <p:childTnLst>
+                  <p:par>
+                    <p:cTn id="65" fill="hold">
+                      <p:stCondLst>
+                        <p:cond delay="indefinite"/>
+                      </p:stCondLst>
+                      <p:childTnLst>
+                        <p:par>
+                          <p:cTn id="66" fill="hold">
+                            <p:stCondLst>
+                              <p:cond delay="0"/>
+                            </p:stCondLst>
+                            <p:childTnLst>
+                              <p:par>
+                                <p:cTn id="67" nodeType="clickEffect" fill="hold" presetClass="entr" presetID="1">
+                                  <p:stCondLst>
+                                    <p:cond delay="0"/>
+                                  </p:stCondLst>
+                                  <p:childTnLst>
+                                    <p:set>
+                                      <p:cBhvr>
+                                        <p:cTn id="68" dur="1" fill="hold">
+                                          <p:stCondLst>
+                                            <p:cond delay="0"/>
+                                          </p:stCondLst>
+                                        </p:cTn>
+                                        <p:tgtEl>
+                                          <p:spTgt spid="329"/>
+                                        </p:tgtEl>
+                                        <p:attrNameLst>
+                                          <p:attrName>style.visibility</p:attrName>
+                                        </p:attrNameLst>
+                                      </p:cBhvr>
+                                      <p:to>
+                                        <p:strVal val="visible"/>
+                                      </p:to>
+                                    </p:set>
+                                  </p:childTnLst>
+                                </p:cTn>
+                              </p:par>
+                              <p:par>
+                                <p:cTn id="69" nodeType="withEffect" fill="hold" presetClass="entr" presetID="1">
+                                  <p:stCondLst>
+                                    <p:cond delay="0"/>
+                                  </p:stCondLst>
+                                  <p:childTnLst>
+                                    <p:set>
+                                      <p:cBhvr>
+                                        <p:cTn id="70" dur="1" fill="hold">
+                                          <p:stCondLst>
+                                            <p:cond delay="0"/>
+                                          </p:stCondLst>
+                                        </p:cTn>
+                                        <p:tgtEl>
+                                          <p:spTgt spid="329">
+                                            <p:txEl>
+                                              <p:pRg st="1" end="1"/>
+                                            </p:txEl>
+                                          </p:spTgt>
+                                        </p:tgtEl>
+                                        <p:attrNameLst>
+                                          <p:attrName>style.visibility</p:attrName>
+                                        </p:attrNameLst>
+                                      </p:cBhvr>
+                                      <p:to>
+                                        <p:strVal val="visible"/>
+                                      </p:to>
+                                    </p:set>
+                                  </p:childTnLst>
+                                </p:cTn>
+                              </p:par>
+                            </p:childTnLst>
+                          </p:cTn>
+                        </p:par>
+                      </p:childTnLst>
+                    </p:cTn>
+                  </p:par>
+                  <p:par>
+                    <p:cTn id="71" fill="hold">
+                      <p:stCondLst>
+                        <p:cond delay="indefinite"/>
+                      </p:stCondLst>
+                      <p:childTnLst>
+                        <p:par>
+                          <p:cTn id="72" fill="hold">
+                            <p:stCondLst>
+                              <p:cond delay="0"/>
+                            </p:stCondLst>
+                            <p:childTnLst>
+                              <p:par>
+                                <p:cTn id="73" nodeType="clickEffect" fill="hold" presetClass="entr" presetID="1">
+                                  <p:stCondLst>
+                                    <p:cond delay="0"/>
+                                  </p:stCondLst>
+                                  <p:childTnLst>
+                                    <p:set>
+                                      <p:cBhvr>
+                                        <p:cTn id="74" dur="1" fill="hold">
+                                          <p:stCondLst>
+                                            <p:cond delay="0"/>
+                                          </p:stCondLst>
+                                        </p:cTn>
+                                        <p:tgtEl>
+                                          <p:spTgt spid="329">
+                                            <p:txEl>
+                                              <p:pRg st="2" end="2"/>
+                                            </p:txEl>
+                                          </p:spTgt>
+                                        </p:tgtEl>
+                                        <p:attrNameLst>
+                                          <p:attrName>style.visibility</p:attrName>
+                                        </p:attrNameLst>
+                                      </p:cBhvr>
+                                      <p:to>
+                                        <p:strVal val="visible"/>
+                                      </p:to>
+                                    </p:set>
+                                  </p:childTnLst>
+                                </p:cTn>
+                              </p:par>
+                            </p:childTnLst>
+                          </p:cTn>
+                        </p:par>
+                      </p:childTnLst>
+                    </p:cTn>
+                  </p:par>
+                  <p:par>
+                    <p:cTn id="75" fill="hold">
+                      <p:stCondLst>
+                        <p:cond delay="indefinite"/>
+                      </p:stCondLst>
+                      <p:childTnLst>
+                        <p:par>
+                          <p:cTn id="76" fill="hold">
+                            <p:stCondLst>
+                              <p:cond delay="0"/>
+                            </p:stCondLst>
+                            <p:childTnLst>
+                              <p:par>
+                                <p:cTn id="77" nodeType="clickEffect" fill="hold" presetClass="entr" presetID="1">
+                                  <p:stCondLst>
+                                    <p:cond delay="0"/>
+                                  </p:stCondLst>
+                                  <p:childTnLst>
+                                    <p:set>
+                                      <p:cBhvr>
+                                        <p:cTn id="78" dur="1" fill="hold">
+                                          <p:stCondLst>
+                                            <p:cond delay="0"/>
+                                          </p:stCondLst>
+                                        </p:cTn>
+                                        <p:tgtEl>
+                                          <p:spTgt spid="329">
+                                            <p:txEl>
+                                              <p:pRg st="3" end="3"/>
+                                            </p:txEl>
+                                          </p:spTgt>
+                                        </p:tgtEl>
+                                        <p:attrNameLst>
+                                          <p:attrName>style.visibility</p:attrName>
+                                        </p:attrNameLst>
+                                      </p:cBhvr>
+                                      <p:to>
+                                        <p:strVal val="visible"/>
+                                      </p:to>
+                                    </p:set>
+                                  </p:childTnLst>
+                                </p:cTn>
+                              </p:par>
+                            </p:childTnLst>
+                          </p:cTn>
+                        </p:par>
+                      </p:childTnLst>
+                    </p:cTn>
+                  </p:par>
+                  <p:par>
+                    <p:cTn id="79" fill="hold">
+                      <p:stCondLst>
+                        <p:cond delay="indefinite"/>
+                      </p:stCondLst>
+                      <p:childTnLst>
+                        <p:par>
+                          <p:cTn id="80" fill="hold">
+                            <p:stCondLst>
+                              <p:cond delay="0"/>
+                            </p:stCondLst>
+                            <p:childTnLst>
+                              <p:par>
+                                <p:cTn id="81" nodeType="clickEffect" fill="hold" presetClass="entr" presetID="1">
+                                  <p:stCondLst>
+                                    <p:cond delay="0"/>
+                                  </p:stCondLst>
+                                  <p:childTnLst>
+                                    <p:set>
+                                      <p:cBhvr>
+                                        <p:cTn id="82" dur="1" fill="hold">
+                                          <p:stCondLst>
+                                            <p:cond delay="0"/>
+                                          </p:stCondLst>
+                                        </p:cTn>
+                                        <p:tgtEl>
+                                          <p:spTgt spid="329">
+                                            <p:txEl>
+                                              <p:pRg st="4" end="4"/>
+                                            </p:txEl>
+                                          </p:spTgt>
+                                        </p:tgtEl>
+                                        <p:attrNameLst>
+                                          <p:attrName>style.visibility</p:attrName>
+                                        </p:attrNameLst>
+                                      </p:cBhvr>
+                                      <p:to>
+                                        <p:strVal val="visible"/>
+                                      </p:to>
+                                    </p:set>
+                                  </p:childTnLst>
+                                </p:cTn>
+                              </p:par>
+                            </p:childTnLst>
+                          </p:cTn>
+                        </p:par>
+                      </p:childTnLst>
+                    </p:cTn>
+                  </p:par>
+                  <p:par>
+                    <p:cTn id="83" fill="hold">
+                      <p:stCondLst>
+                        <p:cond delay="indefinite"/>
+                      </p:stCondLst>
+                      <p:childTnLst>
+                        <p:par>
+                          <p:cTn id="84" fill="hold">
+                            <p:stCondLst>
+                              <p:cond delay="0"/>
+                            </p:stCondLst>
+                            <p:childTnLst>
+                              <p:par>
+                                <p:cTn id="85" nodeType="clickEffect" fill="hold" presetClass="entr" presetID="1">
+                                  <p:stCondLst>
+                                    <p:cond delay="0"/>
+                                  </p:stCondLst>
+                                  <p:childTnLst>
+                                    <p:set>
+                                      <p:cBhvr>
+                                        <p:cTn id="86" dur="1" fill="hold">
+                                          <p:stCondLst>
+                                            <p:cond delay="0"/>
+                                          </p:stCondLst>
+                                        </p:cTn>
+                                        <p:tgtEl>
+                                          <p:spTgt spid="329">
+                                            <p:txEl>
+                                              <p:pRg st="5" end="5"/>
+                                            </p:txEl>
+                                          </p:spTgt>
+                                        </p:tgtEl>
+                                        <p:attrNameLst>
+                                          <p:attrName>style.visibility</p:attrName>
+                                        </p:attrNameLst>
+                                      </p:cBhvr>
+                                      <p:to>
+                                        <p:strVal val="visible"/>
+                                      </p:to>
+                                    </p:set>
+                                  </p:childTnLst>
+                                </p:cTn>
+                              </p:par>
+                            </p:childTnLst>
+                          </p:cTn>
+                        </p:par>
+                      </p:childTnLst>
+                    </p:cTn>
+                  </p:par>
+                </p:childTnLst>
+              </p:cTn>
+              <p:prevCondLst>
+                <p:cond evt="onPrev">
+                  <p:tgtEl>
+                    <p:sldTgt/>
+                  </p:tgtEl>
+                </p:cond>
+              </p:prevCondLst>
+              <p:nextCondLst>
+                <p:cond evt="onNext">
+                  <p:tgtEl>
+                    <p:sldTgt/>
+                  </p:tgtEl>
+                </p:cond>
+              </p:nextCondLst>
+            </p:seq>
+          </p:childTnLst>
+        </p:cTn>
+      </p:par>
+    </p:tnLst>
+  </p:timing>
 </p:sld>
 </file>
 
@@ -14898,7 +15825,7 @@
         <p:spPr>
           <a:xfrm>
             <a:off x="360000" y="1080000"/>
-            <a:ext cx="5938920" cy="5242320"/>
+            <a:ext cx="5938560" cy="5241960"/>
           </a:xfrm>
           <a:prstGeom prst="rect">
             <a:avLst/>
@@ -14921,7 +15848,7 @@
         <p:spPr>
           <a:xfrm>
             <a:off x="6762600" y="1080000"/>
-            <a:ext cx="5116320" cy="5236920"/>
+            <a:ext cx="5115960" cy="5236560"/>
           </a:xfrm>
           <a:prstGeom prst="rect">
             <a:avLst/>
@@ -14940,7 +15867,7 @@
         <p:spPr>
           <a:xfrm>
             <a:off x="3129480" y="115560"/>
-            <a:ext cx="6229440" cy="783360"/>
+            <a:ext cx="6229080" cy="783000"/>
           </a:xfrm>
           <a:prstGeom prst="rect">
             <a:avLst/>
@@ -14992,6 +15919,126 @@
       <p:transition spd="slow"/>
     </mc:Fallback>
   </mc:AlternateContent>
+  <p:timing>
+    <p:tnLst>
+      <p:par>
+        <p:cTn id="87" dur="indefinite" restart="never" nodeType="tmRoot">
+          <p:childTnLst>
+            <p:seq>
+              <p:cTn id="88" dur="indefinite" nodeType="mainSeq">
+                <p:childTnLst>
+                  <p:par>
+                    <p:cTn id="89" fill="hold">
+                      <p:stCondLst>
+                        <p:cond delay="indefinite"/>
+                      </p:stCondLst>
+                      <p:childTnLst>
+                        <p:par>
+                          <p:cTn id="90" fill="hold">
+                            <p:stCondLst>
+                              <p:cond delay="0"/>
+                            </p:stCondLst>
+                            <p:childTnLst>
+                              <p:par>
+                                <p:cTn id="91" nodeType="clickEffect" fill="hold" presetClass="entr" presetID="1">
+                                  <p:stCondLst>
+                                    <p:cond delay="0"/>
+                                  </p:stCondLst>
+                                  <p:childTnLst>
+                                    <p:set>
+                                      <p:cBhvr>
+                                        <p:cTn id="92" dur="1" fill="hold">
+                                          <p:stCondLst>
+                                            <p:cond delay="0"/>
+                                          </p:stCondLst>
+                                        </p:cTn>
+                                        <p:tgtEl>
+                                          <p:spTgt spid="331"/>
+                                        </p:tgtEl>
+                                        <p:attrNameLst>
+                                          <p:attrName>style.visibility</p:attrName>
+                                        </p:attrNameLst>
+                                      </p:cBhvr>
+                                      <p:to>
+                                        <p:strVal val="visible"/>
+                                      </p:to>
+                                    </p:set>
+                                  </p:childTnLst>
+                                </p:cTn>
+                              </p:par>
+                            </p:childTnLst>
+                          </p:cTn>
+                        </p:par>
+                      </p:childTnLst>
+                    </p:cTn>
+                  </p:par>
+                  <p:par>
+                    <p:cTn id="93" fill="hold">
+                      <p:stCondLst>
+                        <p:cond delay="indefinite"/>
+                      </p:stCondLst>
+                      <p:childTnLst>
+                        <p:par>
+                          <p:cTn id="94" fill="hold">
+                            <p:stCondLst>
+                              <p:cond delay="0"/>
+                            </p:stCondLst>
+                            <p:childTnLst>
+                              <p:par>
+                                <p:cTn id="95" nodeType="clickEffect" fill="hold" presetClass="entr" presetID="1">
+                                  <p:stCondLst>
+                                    <p:cond delay="0"/>
+                                  </p:stCondLst>
+                                  <p:childTnLst>
+                                    <p:set>
+                                      <p:cBhvr>
+                                        <p:cTn id="96" dur="1" fill="hold">
+                                          <p:stCondLst>
+                                            <p:cond delay="0"/>
+                                          </p:stCondLst>
+                                        </p:cTn>
+                                        <p:tgtEl>
+                                          <p:spTgt spid="332"/>
+                                        </p:tgtEl>
+                                        <p:attrNameLst>
+                                          <p:attrName>style.visibility</p:attrName>
+                                        </p:attrNameLst>
+                                      </p:cBhvr>
+                                      <p:to>
+                                        <p:strVal val="visible"/>
+                                      </p:to>
+                                    </p:set>
+                                  </p:childTnLst>
+                                </p:cTn>
+                              </p:par>
+                            </p:childTnLst>
+                          </p:cTn>
+                        </p:par>
+                      </p:childTnLst>
+                    </p:cTn>
+                  </p:par>
+                </p:childTnLst>
+              </p:cTn>
+              <p:prevCondLst>
+                <p:cond evt="onPrev">
+                  <p:tgtEl>
+                    <p:sldTgt/>
+                  </p:tgtEl>
+                </p:cond>
+              </p:prevCondLst>
+              <p:nextCondLst>
+                <p:cond evt="onNext">
+                  <p:tgtEl>
+                    <p:sldTgt/>
+                  </p:tgtEl>
+                </p:cond>
+              </p:nextCondLst>
+            </p:seq>
+          </p:childTnLst>
+        </p:cTn>
+      </p:par>
+    </p:tnLst>
+  </p:timing>
 </p:sld>
 </file>
 
@@ -15021,7 +16068,7 @@
         <p:spPr>
           <a:xfrm>
             <a:off x="1980000" y="540000"/>
-            <a:ext cx="7739280" cy="1249560"/>
+            <a:ext cx="7738920" cy="1249200"/>
           </a:xfrm>
           <a:prstGeom prst="rect">
             <a:avLst/>
@@ -15083,7 +16130,7 @@
         <p:spPr>
           <a:xfrm>
             <a:off x="367560" y="1800000"/>
-            <a:ext cx="10971720" cy="3976560"/>
+            <a:ext cx="10971360" cy="3976200"/>
           </a:xfrm>
           <a:prstGeom prst="rect">
             <a:avLst/>
@@ -15175,6 +16222,210 @@
       <p:transition spd="slow"/>
     </mc:Fallback>
   </mc:AlternateContent>
+  <p:timing>
+    <p:tnLst>
+      <p:par>
+        <p:cTn id="97" dur="indefinite" restart="never" nodeType="tmRoot">
+          <p:childTnLst>
+            <p:seq>
+              <p:cTn id="98" dur="indefinite" nodeType="mainSeq">
+                <p:childTnLst>
+                  <p:par>
+                    <p:cTn id="99" fill="hold">
+                      <p:stCondLst>
+                        <p:cond delay="indefinite"/>
+                      </p:stCondLst>
+                      <p:childTnLst>
+                        <p:par>
+                          <p:cTn id="100" fill="hold">
+                            <p:stCondLst>
+                              <p:cond delay="0"/>
+                            </p:stCondLst>
+                            <p:childTnLst>
+                              <p:par>
+                                <p:cTn id="101" nodeType="clickEffect" fill="hold" presetClass="entr" presetID="1">
+                                  <p:stCondLst>
+                                    <p:cond delay="0"/>
+                                  </p:stCondLst>
+                                  <p:childTnLst>
+                                    <p:set>
+                                      <p:cBhvr>
+                                        <p:cTn id="102" dur="1" fill="hold">
+                                          <p:stCondLst>
+                                            <p:cond delay="0"/>
+                                          </p:stCondLst>
+                                        </p:cTn>
+                                        <p:tgtEl>
+                                          <p:spTgt spid="335"/>
+                                        </p:tgtEl>
+                                        <p:attrNameLst>
+                                          <p:attrName>style.visibility</p:attrName>
+                                        </p:attrNameLst>
+                                      </p:cBhvr>
+                                      <p:to>
+                                        <p:strVal val="visible"/>
+                                      </p:to>
+                                    </p:set>
+                                  </p:childTnLst>
+                                </p:cTn>
+                              </p:par>
+                              <p:par>
+                                <p:cTn id="103" nodeType="withEffect" fill="hold" presetClass="entr" presetID="1">
+                                  <p:stCondLst>
+                                    <p:cond delay="0"/>
+                                  </p:stCondLst>
+                                  <p:childTnLst>
+                                    <p:set>
+                                      <p:cBhvr>
+                                        <p:cTn id="104" dur="1" fill="hold">
+                                          <p:stCondLst>
+                                            <p:cond delay="0"/>
+                                          </p:stCondLst>
+                                        </p:cTn>
+                                        <p:tgtEl>
+                                          <p:spTgt spid="335">
+                                            <p:txEl>
+                                              <p:pRg st="0" end="0"/>
+                                            </p:txEl>
+                                          </p:spTgt>
+                                        </p:tgtEl>
+                                        <p:attrNameLst>
+                                          <p:attrName>style.visibility</p:attrName>
+                                        </p:attrNameLst>
+                                      </p:cBhvr>
+                                      <p:to>
+                                        <p:strVal val="visible"/>
+                                      </p:to>
+                                    </p:set>
+                                  </p:childTnLst>
+                                </p:cTn>
+                              </p:par>
+                            </p:childTnLst>
+                          </p:cTn>
+                        </p:par>
+                      </p:childTnLst>
+                    </p:cTn>
+                  </p:par>
+                  <p:par>
+                    <p:cTn id="105" fill="hold">
+                      <p:stCondLst>
+                        <p:cond delay="indefinite"/>
+                      </p:stCondLst>
+                      <p:childTnLst>
+                        <p:par>
+                          <p:cTn id="106" fill="hold">
+                            <p:stCondLst>
+                              <p:cond delay="0"/>
+                            </p:stCondLst>
+                            <p:childTnLst>
+                              <p:par>
+                                <p:cTn id="107" nodeType="clickEffect" fill="hold" presetClass="entr" presetID="1">
+                                  <p:stCondLst>
+                                    <p:cond delay="0"/>
+                                  </p:stCondLst>
+                                  <p:childTnLst>
+                                    <p:set>
+                                      <p:cBhvr>
+                                        <p:cTn id="108" dur="1" fill="hold">
+                                          <p:stCondLst>
+                                            <p:cond delay="0"/>
+                                          </p:stCondLst>
+                                        </p:cTn>
+                                        <p:tgtEl>
+                                          <p:spTgt spid="335">
+                                            <p:txEl>
+                                              <p:pRg st="1" end="1"/>
+                                            </p:txEl>
+                                          </p:spTgt>
+                                        </p:tgtEl>
+                                        <p:attrNameLst>
+                                          <p:attrName>style.visibility</p:attrName>
+                                        </p:attrNameLst>
+                                      </p:cBhvr>
+                                      <p:to>
+                                        <p:strVal val="visible"/>
+                                      </p:to>
+                                    </p:set>
+                                  </p:childTnLst>
+                                </p:cTn>
+                              </p:par>
+                            </p:childTnLst>
+                          </p:cTn>
+                        </p:par>
+                      </p:childTnLst>
+                    </p:cTn>
+                  </p:par>
+                  <p:par>
+                    <p:cTn id="109" fill="hold">
+                      <p:stCondLst>
+                        <p:cond delay="indefinite"/>
+                      </p:stCondLst>
+                      <p:childTnLst>
+                        <p:par>
+                          <p:cTn id="110" fill="hold">
+                            <p:stCondLst>
+                              <p:cond delay="0"/>
+                            </p:stCondLst>
+                            <p:childTnLst>
+                              <p:par>
+                                <p:cTn id="111" nodeType="clickEffect" fill="hold" presetClass="entr" presetID="1">
+                                  <p:stCondLst>
+                                    <p:cond delay="0"/>
+                                  </p:stCondLst>
+                                  <p:childTnLst>
+                                    <p:set>
+                                      <p:cBhvr>
+                                        <p:cTn id="112" dur="1" fill="hold">
+                                          <p:stCondLst>
+                                            <p:cond delay="0"/>
+                                          </p:stCondLst>
+                                        </p:cTn>
+                                        <p:tgtEl>
+                                          <p:spTgt spid="335">
+                                            <p:txEl>
+                                              <p:pRg st="2" end="2"/>
+                                            </p:txEl>
+                                          </p:spTgt>
+                                        </p:tgtEl>
+                                        <p:attrNameLst>
+                                          <p:attrName>style.visibility</p:attrName>
+                                        </p:attrNameLst>
+                                      </p:cBhvr>
+                                      <p:to>
+                                        <p:strVal val="visible"/>
+                                      </p:to>
+                                    </p:set>
+                                  </p:childTnLst>
+                                </p:cTn>
+                              </p:par>
+                            </p:childTnLst>
+                          </p:cTn>
+                        </p:par>
+                      </p:childTnLst>
+                    </p:cTn>
+                  </p:par>
+                </p:childTnLst>
+              </p:cTn>
+              <p:prevCondLst>
+                <p:cond evt="onPrev">
+                  <p:tgtEl>
+                    <p:sldTgt/>
+                  </p:tgtEl>
+                </p:cond>
+              </p:prevCondLst>
+              <p:nextCondLst>
+                <p:cond evt="onNext">
+                  <p:tgtEl>
+                    <p:sldTgt/>
+                  </p:tgtEl>
+                </p:cond>
+              </p:nextCondLst>
+            </p:seq>
+          </p:childTnLst>
+        </p:cTn>
+      </p:par>
+    </p:tnLst>
+  </p:timing>
 </p:sld>
 </file>
 
@@ -15203,8 +16454,8 @@
         </p:nvSpPr>
         <p:spPr>
           <a:xfrm rot="16200000">
-            <a:off x="-162720" y="3826440"/>
-            <a:ext cx="2413440" cy="363600"/>
+            <a:off x="-162360" y="3826800"/>
+            <a:ext cx="2413080" cy="363240"/>
           </a:xfrm>
           <a:prstGeom prst="rect">
             <a:avLst/>
@@ -15230,7 +16481,7 @@
         <p:spPr>
           <a:xfrm>
             <a:off x="4140000" y="72000"/>
-            <a:ext cx="7620840" cy="985320"/>
+            <a:ext cx="7620480" cy="984960"/>
           </a:xfrm>
           <a:prstGeom prst="rect">
             <a:avLst/>
@@ -15285,7 +16536,7 @@
         <p:spPr>
           <a:xfrm>
             <a:off x="5984640" y="1370160"/>
-            <a:ext cx="4980600" cy="2877480"/>
+            <a:ext cx="4980240" cy="2877120"/>
           </a:xfrm>
           <a:prstGeom prst="rect">
             <a:avLst/>
@@ -15308,7 +16559,7 @@
         <p:spPr>
           <a:xfrm>
             <a:off x="1764000" y="1044000"/>
-            <a:ext cx="2196000" cy="4427640"/>
+            <a:ext cx="2195640" cy="4427280"/>
           </a:xfrm>
           <a:prstGeom prst="rect">
             <a:avLst/>

</xml_diff>